<commit_message>
Added some results and so
</commit_message>
<xml_diff>
--- a/Presentation6.pptx
+++ b/Presentation6.pptx
@@ -15,6 +15,14 @@
     <p:sldId id="259" r:id="rId9"/>
     <p:sldId id="260" r:id="rId10"/>
     <p:sldId id="265" r:id="rId11"/>
+    <p:sldId id="266" r:id="rId16"/>
+    <p:sldId id="267" r:id="rId17"/>
+    <p:sldId id="268" r:id="rId18"/>
+    <p:sldId id="269" r:id="rId19"/>
+    <p:sldId id="270" r:id="rId20"/>
+    <p:sldId id="271" r:id="rId21"/>
+    <p:sldId id="272" r:id="rId22"/>
+    <p:sldId id="273" r:id="rId23"/>
   </p:sldIdLst>
   <p:sldSz cx="12192000" cy="6858000"/>
   <p:notesSz cx="6858000" cy="9144000"/>
@@ -298,6 +306,268 @@
     <c:plotVisOnly val="1"/>
     <c:dispBlanksAs val="gap"/>
     <c:showDLblsOverMax val="1"/>
+  </c:chart>
+  <c:txPr>
+    <a:bodyPr/>
+    <a:lstStyle/>
+    <a:p>
+      <a:pPr>
+        <a:defRPr sz="1800"/>
+      </a:pPr>
+      <a:endParaRPr lang="en-US"/>
+    </a:p>
+  </c:txPr>
+  <c:externalData r:id="rId1">
+    <c:autoUpdate val="0"/>
+  </c:externalData>
+</c:chartSpace>
+</file>
+
+<file path=ppt/charts/chart10.xml><?xml version="1.0" encoding="utf-8"?>
+<c:chartSpace xmlns:c="http://schemas.openxmlformats.org/drawingml/2006/chart" xmlns:a="http://schemas.openxmlformats.org/drawingml/2006/main" xmlns:r="http://schemas.openxmlformats.org/officeDocument/2006/relationships">
+  <c:date1904 val="0"/>
+  <c:chart>
+    <c:title>
+      <c:tx>
+        <c:rich>
+          <a:bodyPr/>
+          <a:lstStyle/>
+          <a:p>
+            <a:r>
+              <a:t>GROOT GEEL PIESANGS</a:t>
+            </a:r>
+          </a:p>
+        </c:rich>
+      </c:tx>
+      <c:layout/>
+      <c:overlay val="0"/>
+    </c:title>
+    <c:autoTitleDeleted val="0"/>
+    <c:plotArea>
+      <c:barChart>
+        <c:barDir val="col"/>
+        <c:grouping val="clustered"/>
+        <c:ser>
+          <c:idx val="0"/>
+          <c:order val="0"/>
+          <c:tx>
+            <c:strRef>
+              <c:f>Sheet1!$B$1</c:f>
+              <c:strCache>
+                <c:ptCount val="1"/>
+                <c:pt idx="0">
+                  <c:v>Normalized Frequency</c:v>
+                </c:pt>
+              </c:strCache>
+            </c:strRef>
+          </c:tx>
+          <c:cat>
+            <c:strRef>
+              <c:f>Sheet1!$A$2:$A$5</c:f>
+              <c:strCache>
+                <c:ptCount val="4"/>
+                <c:pt idx="0">
+                  <c:v>segment1</c:v>
+                </c:pt>
+                <c:pt idx="1">
+                  <c:v>segment2</c:v>
+                </c:pt>
+                <c:pt idx="2">
+                  <c:v>segment3</c:v>
+                </c:pt>
+                <c:pt idx="3">
+                  <c:v>segment4</c:v>
+                </c:pt>
+              </c:strCache>
+            </c:strRef>
+          </c:cat>
+          <c:val>
+            <c:numRef>
+              <c:f>Sheet1!$B$2:$B$5</c:f>
+              <c:numCache>
+                <c:formatCode>General</c:formatCode>
+                <c:ptCount val="4"/>
+                <c:pt idx="0">
+                  <c:v>1.9124503287942076</c:v>
+                </c:pt>
+                <c:pt idx="1">
+                  <c:v>1.7629376557059053</c:v>
+                </c:pt>
+                <c:pt idx="2">
+                  <c:v>1.6789408194384026</c:v>
+                </c:pt>
+                <c:pt idx="3">
+                  <c:v>1.5542256039964475</c:v>
+                </c:pt>
+              </c:numCache>
+            </c:numRef>
+          </c:val>
+        </c:ser>
+        <c:axId val="-2068027336"/>
+        <c:axId val="-2113994440"/>
+      </c:barChart>
+      <c:catAx>
+        <c:axId val="-2068027336"/>
+        <c:scaling>
+          <c:orientation val="minMax"/>
+        </c:scaling>
+        <c:delete val="0"/>
+        <c:axPos val="b"/>
+        <c:majorTickMark val="out"/>
+        <c:minorTickMark val="none"/>
+        <c:tickLblPos val="nextTo"/>
+        <c:crossAx val="-2113994440"/>
+        <c:crosses val="autoZero"/>
+        <c:auto val="1"/>
+        <c:lblAlgn val="ctr"/>
+        <c:lblOffset val="100"/>
+        <c:noMultiLvlLbl val="0"/>
+      </c:catAx>
+      <c:valAx>
+        <c:axId val="-2113994440"/>
+        <c:scaling/>
+        <c:delete val="0"/>
+        <c:axPos val="l"/>
+        <c:majorGridlines/>
+        <c:majorTickMark val="out"/>
+        <c:minorTickMark val="none"/>
+        <c:tickLblPos val="nextTo"/>
+        <c:crossAx val="-2068027336"/>
+        <c:crosses val="autoZero"/>
+      </c:valAx>
+    </c:plotArea>
+    <c:dispBlanksAs val="gap"/>
+  </c:chart>
+  <c:txPr>
+    <a:bodyPr/>
+    <a:lstStyle/>
+    <a:p>
+      <a:pPr>
+        <a:defRPr sz="1800"/>
+      </a:pPr>
+      <a:endParaRPr lang="en-US"/>
+    </a:p>
+  </c:txPr>
+  <c:externalData r:id="rId1">
+    <c:autoUpdate val="0"/>
+  </c:externalData>
+</c:chartSpace>
+</file>
+
+<file path=ppt/charts/chart11.xml><?xml version="1.0" encoding="utf-8"?>
+<c:chartSpace xmlns:c="http://schemas.openxmlformats.org/drawingml/2006/chart" xmlns:a="http://schemas.openxmlformats.org/drawingml/2006/main" xmlns:r="http://schemas.openxmlformats.org/officeDocument/2006/relationships">
+  <c:date1904 val="0"/>
+  <c:chart>
+    <c:title>
+      <c:tx>
+        <c:rich>
+          <a:bodyPr/>
+          <a:lstStyle/>
+          <a:p>
+            <a:r>
+              <a:t>Woestersous</a:t>
+            </a:r>
+          </a:p>
+        </c:rich>
+      </c:tx>
+      <c:layout/>
+      <c:overlay val="0"/>
+    </c:title>
+    <c:autoTitleDeleted val="0"/>
+    <c:plotArea>
+      <c:barChart>
+        <c:barDir val="col"/>
+        <c:grouping val="clustered"/>
+        <c:ser>
+          <c:idx val="0"/>
+          <c:order val="0"/>
+          <c:tx>
+            <c:strRef>
+              <c:f>Sheet1!$B$1</c:f>
+              <c:strCache>
+                <c:ptCount val="1"/>
+                <c:pt idx="0">
+                  <c:v>Nananas</c:v>
+                </c:pt>
+              </c:strCache>
+            </c:strRef>
+          </c:tx>
+          <c:cat>
+            <c:strRef>
+              <c:f>Sheet1!$A$2:$A$5</c:f>
+              <c:strCache>
+                <c:ptCount val="4"/>
+                <c:pt idx="0">
+                  <c:v>segment1</c:v>
+                </c:pt>
+                <c:pt idx="1">
+                  <c:v>segment2</c:v>
+                </c:pt>
+                <c:pt idx="2">
+                  <c:v>segment3</c:v>
+                </c:pt>
+                <c:pt idx="3">
+                  <c:v>segment4</c:v>
+                </c:pt>
+              </c:strCache>
+            </c:strRef>
+          </c:cat>
+          <c:val>
+            <c:numRef>
+              <c:f>Sheet1!$B$2:$B$5</c:f>
+              <c:numCache>
+                <c:formatCode>General</c:formatCode>
+                <c:ptCount val="4"/>
+                <c:pt idx="0">
+                  <c:v>0.06852055585944943</c:v>
+                </c:pt>
+                <c:pt idx="1">
+                  <c:v>0.06679645045452935</c:v>
+                </c:pt>
+                <c:pt idx="2">
+                  <c:v>0.06981834137033431</c:v>
+                </c:pt>
+                <c:pt idx="3">
+                  <c:v>0.06423027837780554</c:v>
+                </c:pt>
+              </c:numCache>
+            </c:numRef>
+          </c:val>
+        </c:ser>
+        <c:axId val="-2068027336"/>
+        <c:axId val="-2113994440"/>
+      </c:barChart>
+      <c:catAx>
+        <c:axId val="-2068027336"/>
+        <c:scaling>
+          <c:orientation val="minMax"/>
+        </c:scaling>
+        <c:delete val="0"/>
+        <c:axPos val="b"/>
+        <c:majorTickMark val="out"/>
+        <c:minorTickMark val="none"/>
+        <c:tickLblPos val="nextTo"/>
+        <c:crossAx val="-2113994440"/>
+        <c:crosses val="autoZero"/>
+        <c:auto val="1"/>
+        <c:lblAlgn val="ctr"/>
+        <c:lblOffset val="100"/>
+        <c:noMultiLvlLbl val="0"/>
+      </c:catAx>
+      <c:valAx>
+        <c:axId val="-2113994440"/>
+        <c:scaling/>
+        <c:delete val="0"/>
+        <c:axPos val="l"/>
+        <c:majorGridlines/>
+        <c:majorTickMark val="out"/>
+        <c:minorTickMark val="none"/>
+        <c:tickLblPos val="nextTo"/>
+        <c:crossAx val="-2068027336"/>
+        <c:crosses val="autoZero"/>
+      </c:valAx>
+    </c:plotArea>
+    <c:dispBlanksAs val="gap"/>
   </c:chart>
   <c:txPr>
     <a:bodyPr/>
@@ -1155,6 +1425,792 @@
     <a:p>
       <a:pPr>
         <a:defRPr/>
+      </a:pPr>
+      <a:endParaRPr lang="en-US"/>
+    </a:p>
+  </c:txPr>
+  <c:externalData r:id="rId1">
+    <c:autoUpdate val="0"/>
+  </c:externalData>
+</c:chartSpace>
+</file>
+
+<file path=ppt/charts/chart4.xml><?xml version="1.0" encoding="utf-8"?>
+<c:chartSpace xmlns:c="http://schemas.openxmlformats.org/drawingml/2006/chart" xmlns:a="http://schemas.openxmlformats.org/drawingml/2006/main" xmlns:r="http://schemas.openxmlformats.org/officeDocument/2006/relationships">
+  <c:date1904 val="0"/>
+  <c:chart>
+    <c:title>
+      <c:tx>
+        <c:rich>
+          <a:bodyPr/>
+          <a:lstStyle/>
+          <a:p>
+            <a:r>
+              <a:t>GROOT GEEL PIESANGS</a:t>
+            </a:r>
+          </a:p>
+        </c:rich>
+      </c:tx>
+      <c:layout/>
+      <c:overlay val="0"/>
+    </c:title>
+    <c:autoTitleDeleted val="0"/>
+    <c:plotArea>
+      <c:barChart>
+        <c:barDir val="col"/>
+        <c:grouping val="clustered"/>
+        <c:ser>
+          <c:idx val="0"/>
+          <c:order val="0"/>
+          <c:tx>
+            <c:strRef>
+              <c:f>Sheet1!$B$1</c:f>
+              <c:strCache>
+                <c:ptCount val="1"/>
+                <c:pt idx="0">
+                  <c:v>Normalized Frequency</c:v>
+                </c:pt>
+              </c:strCache>
+            </c:strRef>
+          </c:tx>
+          <c:cat>
+            <c:strRef>
+              <c:f>Sheet1!$A$2:$A$5</c:f>
+              <c:strCache>
+                <c:ptCount val="4"/>
+                <c:pt idx="0">
+                  <c:v>segment1</c:v>
+                </c:pt>
+                <c:pt idx="1">
+                  <c:v>segment2</c:v>
+                </c:pt>
+                <c:pt idx="2">
+                  <c:v>segment3</c:v>
+                </c:pt>
+                <c:pt idx="3">
+                  <c:v>segment4</c:v>
+                </c:pt>
+              </c:strCache>
+            </c:strRef>
+          </c:cat>
+          <c:val>
+            <c:numRef>
+              <c:f>Sheet1!$B$2:$B$5</c:f>
+              <c:numCache>
+                <c:formatCode>General</c:formatCode>
+                <c:ptCount val="4"/>
+                <c:pt idx="0">
+                  <c:v>1.9124503287942076</c:v>
+                </c:pt>
+                <c:pt idx="1">
+                  <c:v>1.7629376557059053</c:v>
+                </c:pt>
+                <c:pt idx="2">
+                  <c:v>1.6789408194384026</c:v>
+                </c:pt>
+                <c:pt idx="3">
+                  <c:v>1.5542256039964475</c:v>
+                </c:pt>
+              </c:numCache>
+            </c:numRef>
+          </c:val>
+        </c:ser>
+        <c:axId val="-2068027336"/>
+        <c:axId val="-2113994440"/>
+      </c:barChart>
+      <c:catAx>
+        <c:axId val="-2068027336"/>
+        <c:scaling>
+          <c:orientation val="minMax"/>
+        </c:scaling>
+        <c:delete val="0"/>
+        <c:axPos val="b"/>
+        <c:majorTickMark val="out"/>
+        <c:minorTickMark val="none"/>
+        <c:tickLblPos val="nextTo"/>
+        <c:crossAx val="-2113994440"/>
+        <c:crosses val="autoZero"/>
+        <c:auto val="1"/>
+        <c:lblAlgn val="ctr"/>
+        <c:lblOffset val="100"/>
+        <c:noMultiLvlLbl val="0"/>
+      </c:catAx>
+      <c:valAx>
+        <c:axId val="-2113994440"/>
+        <c:scaling/>
+        <c:delete val="0"/>
+        <c:axPos val="l"/>
+        <c:majorGridlines/>
+        <c:majorTickMark val="out"/>
+        <c:minorTickMark val="none"/>
+        <c:tickLblPos val="nextTo"/>
+        <c:crossAx val="-2068027336"/>
+        <c:crosses val="autoZero"/>
+      </c:valAx>
+    </c:plotArea>
+    <c:dispBlanksAs val="gap"/>
+  </c:chart>
+  <c:txPr>
+    <a:bodyPr/>
+    <a:lstStyle/>
+    <a:p>
+      <a:pPr>
+        <a:defRPr sz="1800"/>
+      </a:pPr>
+      <a:endParaRPr lang="en-US"/>
+    </a:p>
+  </c:txPr>
+  <c:externalData r:id="rId1">
+    <c:autoUpdate val="0"/>
+  </c:externalData>
+</c:chartSpace>
+</file>
+
+<file path=ppt/charts/chart5.xml><?xml version="1.0" encoding="utf-8"?>
+<c:chartSpace xmlns:c="http://schemas.openxmlformats.org/drawingml/2006/chart" xmlns:a="http://schemas.openxmlformats.org/drawingml/2006/main" xmlns:r="http://schemas.openxmlformats.org/officeDocument/2006/relationships">
+  <c:date1904 val="0"/>
+  <c:chart>
+    <c:title>
+      <c:tx>
+        <c:rich>
+          <a:bodyPr/>
+          <a:lstStyle/>
+          <a:p>
+            <a:r>
+              <a:t>GROOT GEEL PIESANGS</a:t>
+            </a:r>
+          </a:p>
+        </c:rich>
+      </c:tx>
+      <c:layout/>
+      <c:overlay val="0"/>
+    </c:title>
+    <c:autoTitleDeleted val="0"/>
+    <c:plotArea>
+      <c:barChart>
+        <c:barDir val="col"/>
+        <c:grouping val="clustered"/>
+        <c:ser>
+          <c:idx val="0"/>
+          <c:order val="0"/>
+          <c:tx>
+            <c:strRef>
+              <c:f>Sheet1!$B$1</c:f>
+              <c:strCache>
+                <c:ptCount val="1"/>
+                <c:pt idx="0">
+                  <c:v>Normalized Frequency</c:v>
+                </c:pt>
+              </c:strCache>
+            </c:strRef>
+          </c:tx>
+          <c:cat>
+            <c:strRef>
+              <c:f>Sheet1!$A$2:$A$5</c:f>
+              <c:strCache>
+                <c:ptCount val="4"/>
+                <c:pt idx="0">
+                  <c:v>segment1</c:v>
+                </c:pt>
+                <c:pt idx="1">
+                  <c:v>segment2</c:v>
+                </c:pt>
+                <c:pt idx="2">
+                  <c:v>segment3</c:v>
+                </c:pt>
+                <c:pt idx="3">
+                  <c:v>segment4</c:v>
+                </c:pt>
+              </c:strCache>
+            </c:strRef>
+          </c:cat>
+          <c:val>
+            <c:numRef>
+              <c:f>Sheet1!$B$2:$B$5</c:f>
+              <c:numCache>
+                <c:formatCode>General</c:formatCode>
+                <c:ptCount val="4"/>
+                <c:pt idx="0">
+                  <c:v>1.9124503287942076</c:v>
+                </c:pt>
+                <c:pt idx="1">
+                  <c:v>1.7629376557059053</c:v>
+                </c:pt>
+                <c:pt idx="2">
+                  <c:v>1.6789408194384026</c:v>
+                </c:pt>
+                <c:pt idx="3">
+                  <c:v>1.5542256039964475</c:v>
+                </c:pt>
+              </c:numCache>
+            </c:numRef>
+          </c:val>
+        </c:ser>
+        <c:axId val="-2068027336"/>
+        <c:axId val="-2113994440"/>
+      </c:barChart>
+      <c:catAx>
+        <c:axId val="-2068027336"/>
+        <c:scaling>
+          <c:orientation val="minMax"/>
+        </c:scaling>
+        <c:delete val="0"/>
+        <c:axPos val="b"/>
+        <c:majorTickMark val="out"/>
+        <c:minorTickMark val="none"/>
+        <c:tickLblPos val="nextTo"/>
+        <c:crossAx val="-2113994440"/>
+        <c:crosses val="autoZero"/>
+        <c:auto val="1"/>
+        <c:lblAlgn val="ctr"/>
+        <c:lblOffset val="100"/>
+        <c:noMultiLvlLbl val="0"/>
+      </c:catAx>
+      <c:valAx>
+        <c:axId val="-2113994440"/>
+        <c:scaling/>
+        <c:delete val="0"/>
+        <c:axPos val="l"/>
+        <c:majorGridlines/>
+        <c:majorTickMark val="out"/>
+        <c:minorTickMark val="none"/>
+        <c:tickLblPos val="nextTo"/>
+        <c:crossAx val="-2068027336"/>
+        <c:crosses val="autoZero"/>
+      </c:valAx>
+    </c:plotArea>
+    <c:dispBlanksAs val="gap"/>
+  </c:chart>
+  <c:txPr>
+    <a:bodyPr/>
+    <a:lstStyle/>
+    <a:p>
+      <a:pPr>
+        <a:defRPr sz="1800"/>
+      </a:pPr>
+      <a:endParaRPr lang="en-US"/>
+    </a:p>
+  </c:txPr>
+  <c:externalData r:id="rId1">
+    <c:autoUpdate val="0"/>
+  </c:externalData>
+</c:chartSpace>
+</file>
+
+<file path=ppt/charts/chart6.xml><?xml version="1.0" encoding="utf-8"?>
+<c:chartSpace xmlns:c="http://schemas.openxmlformats.org/drawingml/2006/chart" xmlns:a="http://schemas.openxmlformats.org/drawingml/2006/main" xmlns:r="http://schemas.openxmlformats.org/officeDocument/2006/relationships">
+  <c:date1904 val="0"/>
+  <c:chart>
+    <c:title>
+      <c:tx>
+        <c:rich>
+          <a:bodyPr/>
+          <a:lstStyle/>
+          <a:p>
+            <a:r>
+              <a:t>GROOT GEEL PIESANGS</a:t>
+            </a:r>
+          </a:p>
+        </c:rich>
+      </c:tx>
+      <c:layout/>
+      <c:overlay val="0"/>
+    </c:title>
+    <c:autoTitleDeleted val="0"/>
+    <c:plotArea>
+      <c:barChart>
+        <c:barDir val="col"/>
+        <c:grouping val="clustered"/>
+        <c:ser>
+          <c:idx val="0"/>
+          <c:order val="0"/>
+          <c:tx>
+            <c:strRef>
+              <c:f>Sheet1!$B$1</c:f>
+              <c:strCache>
+                <c:ptCount val="1"/>
+                <c:pt idx="0">
+                  <c:v>Normalized Frequency</c:v>
+                </c:pt>
+              </c:strCache>
+            </c:strRef>
+          </c:tx>
+          <c:cat>
+            <c:strRef>
+              <c:f>Sheet1!$A$2:$A$5</c:f>
+              <c:strCache>
+                <c:ptCount val="4"/>
+                <c:pt idx="0">
+                  <c:v>segment1</c:v>
+                </c:pt>
+                <c:pt idx="1">
+                  <c:v>segment2</c:v>
+                </c:pt>
+                <c:pt idx="2">
+                  <c:v>segment3</c:v>
+                </c:pt>
+                <c:pt idx="3">
+                  <c:v>segment4</c:v>
+                </c:pt>
+              </c:strCache>
+            </c:strRef>
+          </c:cat>
+          <c:val>
+            <c:numRef>
+              <c:f>Sheet1!$B$2:$B$5</c:f>
+              <c:numCache>
+                <c:formatCode>General</c:formatCode>
+                <c:ptCount val="4"/>
+                <c:pt idx="0">
+                  <c:v>1.9124503287942076</c:v>
+                </c:pt>
+                <c:pt idx="1">
+                  <c:v>1.7629376557059053</c:v>
+                </c:pt>
+                <c:pt idx="2">
+                  <c:v>1.6789408194384026</c:v>
+                </c:pt>
+                <c:pt idx="3">
+                  <c:v>1.5542256039964475</c:v>
+                </c:pt>
+              </c:numCache>
+            </c:numRef>
+          </c:val>
+        </c:ser>
+        <c:axId val="-2068027336"/>
+        <c:axId val="-2113994440"/>
+      </c:barChart>
+      <c:catAx>
+        <c:axId val="-2068027336"/>
+        <c:scaling>
+          <c:orientation val="minMax"/>
+        </c:scaling>
+        <c:delete val="0"/>
+        <c:axPos val="b"/>
+        <c:majorTickMark val="out"/>
+        <c:minorTickMark val="none"/>
+        <c:tickLblPos val="nextTo"/>
+        <c:crossAx val="-2113994440"/>
+        <c:crosses val="autoZero"/>
+        <c:auto val="1"/>
+        <c:lblAlgn val="ctr"/>
+        <c:lblOffset val="100"/>
+        <c:noMultiLvlLbl val="0"/>
+      </c:catAx>
+      <c:valAx>
+        <c:axId val="-2113994440"/>
+        <c:scaling/>
+        <c:delete val="0"/>
+        <c:axPos val="l"/>
+        <c:majorGridlines/>
+        <c:majorTickMark val="out"/>
+        <c:minorTickMark val="none"/>
+        <c:tickLblPos val="nextTo"/>
+        <c:crossAx val="-2068027336"/>
+        <c:crosses val="autoZero"/>
+      </c:valAx>
+    </c:plotArea>
+    <c:dispBlanksAs val="gap"/>
+  </c:chart>
+  <c:txPr>
+    <a:bodyPr/>
+    <a:lstStyle/>
+    <a:p>
+      <a:pPr>
+        <a:defRPr sz="1800"/>
+      </a:pPr>
+      <a:endParaRPr lang="en-US"/>
+    </a:p>
+  </c:txPr>
+  <c:externalData r:id="rId1">
+    <c:autoUpdate val="0"/>
+  </c:externalData>
+</c:chartSpace>
+</file>
+
+<file path=ppt/charts/chart7.xml><?xml version="1.0" encoding="utf-8"?>
+<c:chartSpace xmlns:c="http://schemas.openxmlformats.org/drawingml/2006/chart" xmlns:a="http://schemas.openxmlformats.org/drawingml/2006/main" xmlns:r="http://schemas.openxmlformats.org/officeDocument/2006/relationships">
+  <c:date1904 val="0"/>
+  <c:chart>
+    <c:title>
+      <c:tx>
+        <c:rich>
+          <a:bodyPr/>
+          <a:lstStyle/>
+          <a:p>
+            <a:r>
+              <a:t>Woestersous</a:t>
+            </a:r>
+          </a:p>
+        </c:rich>
+      </c:tx>
+      <c:layout/>
+      <c:overlay val="0"/>
+    </c:title>
+    <c:autoTitleDeleted val="0"/>
+    <c:plotArea>
+      <c:barChart>
+        <c:barDir val="col"/>
+        <c:grouping val="clustered"/>
+        <c:ser>
+          <c:idx val="0"/>
+          <c:order val="0"/>
+          <c:tx>
+            <c:strRef>
+              <c:f>Sheet1!$B$1</c:f>
+              <c:strCache>
+                <c:ptCount val="1"/>
+                <c:pt idx="0">
+                  <c:v>Normalized Frequency</c:v>
+                </c:pt>
+              </c:strCache>
+            </c:strRef>
+          </c:tx>
+          <c:cat>
+            <c:strRef>
+              <c:f>Sheet1!$A$2:$A$5</c:f>
+              <c:strCache>
+                <c:ptCount val="4"/>
+                <c:pt idx="0">
+                  <c:v>segment1</c:v>
+                </c:pt>
+                <c:pt idx="1">
+                  <c:v>segment2</c:v>
+                </c:pt>
+                <c:pt idx="2">
+                  <c:v>segment3</c:v>
+                </c:pt>
+                <c:pt idx="3">
+                  <c:v>segment4</c:v>
+                </c:pt>
+              </c:strCache>
+            </c:strRef>
+          </c:cat>
+          <c:val>
+            <c:numRef>
+              <c:f>Sheet1!$B$2:$B$5</c:f>
+              <c:numCache>
+                <c:formatCode>General</c:formatCode>
+                <c:ptCount val="4"/>
+                <c:pt idx="0">
+                  <c:v>0.06852055585944943</c:v>
+                </c:pt>
+                <c:pt idx="1">
+                  <c:v>0.06679645045452935</c:v>
+                </c:pt>
+                <c:pt idx="2">
+                  <c:v>0.06981834137033431</c:v>
+                </c:pt>
+                <c:pt idx="3">
+                  <c:v>0.06423027837780554</c:v>
+                </c:pt>
+              </c:numCache>
+            </c:numRef>
+          </c:val>
+        </c:ser>
+        <c:axId val="-2068027336"/>
+        <c:axId val="-2113994440"/>
+      </c:barChart>
+      <c:catAx>
+        <c:axId val="-2068027336"/>
+        <c:scaling>
+          <c:orientation val="minMax"/>
+        </c:scaling>
+        <c:delete val="0"/>
+        <c:axPos val="b"/>
+        <c:majorTickMark val="out"/>
+        <c:minorTickMark val="none"/>
+        <c:tickLblPos val="nextTo"/>
+        <c:crossAx val="-2113994440"/>
+        <c:crosses val="autoZero"/>
+        <c:auto val="1"/>
+        <c:lblAlgn val="ctr"/>
+        <c:lblOffset val="100"/>
+        <c:noMultiLvlLbl val="0"/>
+      </c:catAx>
+      <c:valAx>
+        <c:axId val="-2113994440"/>
+        <c:scaling/>
+        <c:delete val="0"/>
+        <c:axPos val="l"/>
+        <c:majorGridlines/>
+        <c:majorTickMark val="out"/>
+        <c:minorTickMark val="none"/>
+        <c:tickLblPos val="nextTo"/>
+        <c:crossAx val="-2068027336"/>
+        <c:crosses val="autoZero"/>
+      </c:valAx>
+    </c:plotArea>
+    <c:dispBlanksAs val="gap"/>
+  </c:chart>
+  <c:txPr>
+    <a:bodyPr/>
+    <a:lstStyle/>
+    <a:p>
+      <a:pPr>
+        <a:defRPr sz="1800"/>
+      </a:pPr>
+      <a:endParaRPr lang="en-US"/>
+    </a:p>
+  </c:txPr>
+  <c:externalData r:id="rId1">
+    <c:autoUpdate val="0"/>
+  </c:externalData>
+</c:chartSpace>
+</file>
+
+<file path=ppt/charts/chart8.xml><?xml version="1.0" encoding="utf-8"?>
+<c:chartSpace xmlns:c="http://schemas.openxmlformats.org/drawingml/2006/chart" xmlns:a="http://schemas.openxmlformats.org/drawingml/2006/main" xmlns:r="http://schemas.openxmlformats.org/officeDocument/2006/relationships">
+  <c:date1904 val="0"/>
+  <c:chart>
+    <c:title>
+      <c:tx>
+        <c:rich>
+          <a:bodyPr/>
+          <a:lstStyle/>
+          <a:p>
+            <a:r>
+              <a:t>GROOT GEEL PIESANGS</a:t>
+            </a:r>
+          </a:p>
+        </c:rich>
+      </c:tx>
+      <c:layout/>
+      <c:overlay val="0"/>
+    </c:title>
+    <c:autoTitleDeleted val="0"/>
+    <c:plotArea>
+      <c:barChart>
+        <c:barDir val="col"/>
+        <c:grouping val="clustered"/>
+        <c:ser>
+          <c:idx val="0"/>
+          <c:order val="0"/>
+          <c:tx>
+            <c:strRef>
+              <c:f>Sheet1!$B$1</c:f>
+              <c:strCache>
+                <c:ptCount val="1"/>
+                <c:pt idx="0">
+                  <c:v>Normalized Frequency</c:v>
+                </c:pt>
+              </c:strCache>
+            </c:strRef>
+          </c:tx>
+          <c:cat>
+            <c:strRef>
+              <c:f>Sheet1!$A$2:$A$5</c:f>
+              <c:strCache>
+                <c:ptCount val="4"/>
+                <c:pt idx="0">
+                  <c:v>segment1</c:v>
+                </c:pt>
+                <c:pt idx="1">
+                  <c:v>segment2</c:v>
+                </c:pt>
+                <c:pt idx="2">
+                  <c:v>segment3</c:v>
+                </c:pt>
+                <c:pt idx="3">
+                  <c:v>segment4</c:v>
+                </c:pt>
+              </c:strCache>
+            </c:strRef>
+          </c:cat>
+          <c:val>
+            <c:numRef>
+              <c:f>Sheet1!$B$2:$B$5</c:f>
+              <c:numCache>
+                <c:formatCode>General</c:formatCode>
+                <c:ptCount val="4"/>
+                <c:pt idx="0">
+                  <c:v>1.9124503287942076</c:v>
+                </c:pt>
+                <c:pt idx="1">
+                  <c:v>1.7629376557059053</c:v>
+                </c:pt>
+                <c:pt idx="2">
+                  <c:v>1.6789408194384026</c:v>
+                </c:pt>
+                <c:pt idx="3">
+                  <c:v>1.5542256039964475</c:v>
+                </c:pt>
+              </c:numCache>
+            </c:numRef>
+          </c:val>
+        </c:ser>
+        <c:axId val="-2068027336"/>
+        <c:axId val="-2113994440"/>
+      </c:barChart>
+      <c:catAx>
+        <c:axId val="-2068027336"/>
+        <c:scaling>
+          <c:orientation val="minMax"/>
+        </c:scaling>
+        <c:delete val="0"/>
+        <c:axPos val="b"/>
+        <c:majorTickMark val="out"/>
+        <c:minorTickMark val="none"/>
+        <c:tickLblPos val="nextTo"/>
+        <c:crossAx val="-2113994440"/>
+        <c:crosses val="autoZero"/>
+        <c:auto val="1"/>
+        <c:lblAlgn val="ctr"/>
+        <c:lblOffset val="100"/>
+        <c:noMultiLvlLbl val="0"/>
+      </c:catAx>
+      <c:valAx>
+        <c:axId val="-2113994440"/>
+        <c:scaling/>
+        <c:delete val="0"/>
+        <c:axPos val="l"/>
+        <c:majorGridlines/>
+        <c:majorTickMark val="out"/>
+        <c:minorTickMark val="none"/>
+        <c:tickLblPos val="nextTo"/>
+        <c:crossAx val="-2068027336"/>
+        <c:crosses val="autoZero"/>
+      </c:valAx>
+    </c:plotArea>
+    <c:dispBlanksAs val="gap"/>
+  </c:chart>
+  <c:txPr>
+    <a:bodyPr/>
+    <a:lstStyle/>
+    <a:p>
+      <a:pPr>
+        <a:defRPr sz="1800"/>
+      </a:pPr>
+      <a:endParaRPr lang="en-US"/>
+    </a:p>
+  </c:txPr>
+  <c:externalData r:id="rId1">
+    <c:autoUpdate val="0"/>
+  </c:externalData>
+</c:chartSpace>
+</file>
+
+<file path=ppt/charts/chart9.xml><?xml version="1.0" encoding="utf-8"?>
+<c:chartSpace xmlns:c="http://schemas.openxmlformats.org/drawingml/2006/chart" xmlns:a="http://schemas.openxmlformats.org/drawingml/2006/main" xmlns:r="http://schemas.openxmlformats.org/officeDocument/2006/relationships">
+  <c:date1904 val="0"/>
+  <c:chart>
+    <c:title>
+      <c:tx>
+        <c:rich>
+          <a:bodyPr/>
+          <a:lstStyle/>
+          <a:p>
+            <a:r>
+              <a:t>Woestersous</a:t>
+            </a:r>
+          </a:p>
+        </c:rich>
+      </c:tx>
+      <c:layout/>
+      <c:overlay val="0"/>
+    </c:title>
+    <c:autoTitleDeleted val="0"/>
+    <c:plotArea>
+      <c:barChart>
+        <c:barDir val="col"/>
+        <c:grouping val="clustered"/>
+        <c:ser>
+          <c:idx val="0"/>
+          <c:order val="0"/>
+          <c:tx>
+            <c:strRef>
+              <c:f>Sheet1!$B$1</c:f>
+              <c:strCache>
+                <c:ptCount val="1"/>
+                <c:pt idx="0">
+                  <c:v>Normalized Frequency</c:v>
+                </c:pt>
+              </c:strCache>
+            </c:strRef>
+          </c:tx>
+          <c:cat>
+            <c:strRef>
+              <c:f>Sheet1!$A$2:$A$5</c:f>
+              <c:strCache>
+                <c:ptCount val="4"/>
+                <c:pt idx="0">
+                  <c:v>segment1</c:v>
+                </c:pt>
+                <c:pt idx="1">
+                  <c:v>segment2</c:v>
+                </c:pt>
+                <c:pt idx="2">
+                  <c:v>segment3</c:v>
+                </c:pt>
+                <c:pt idx="3">
+                  <c:v>segment4</c:v>
+                </c:pt>
+              </c:strCache>
+            </c:strRef>
+          </c:cat>
+          <c:val>
+            <c:numRef>
+              <c:f>Sheet1!$B$2:$B$5</c:f>
+              <c:numCache>
+                <c:formatCode>General</c:formatCode>
+                <c:ptCount val="4"/>
+                <c:pt idx="0">
+                  <c:v>0.06852055585944943</c:v>
+                </c:pt>
+                <c:pt idx="1">
+                  <c:v>0.06679645045452935</c:v>
+                </c:pt>
+                <c:pt idx="2">
+                  <c:v>0.06981834137033431</c:v>
+                </c:pt>
+                <c:pt idx="3">
+                  <c:v>0.06423027837780554</c:v>
+                </c:pt>
+              </c:numCache>
+            </c:numRef>
+          </c:val>
+        </c:ser>
+        <c:axId val="-2068027336"/>
+        <c:axId val="-2113994440"/>
+      </c:barChart>
+      <c:catAx>
+        <c:axId val="-2068027336"/>
+        <c:scaling>
+          <c:orientation val="minMax"/>
+        </c:scaling>
+        <c:delete val="0"/>
+        <c:axPos val="b"/>
+        <c:majorTickMark val="out"/>
+        <c:minorTickMark val="none"/>
+        <c:tickLblPos val="nextTo"/>
+        <c:crossAx val="-2113994440"/>
+        <c:crosses val="autoZero"/>
+        <c:auto val="1"/>
+        <c:lblAlgn val="ctr"/>
+        <c:lblOffset val="100"/>
+        <c:noMultiLvlLbl val="0"/>
+      </c:catAx>
+      <c:valAx>
+        <c:axId val="-2113994440"/>
+        <c:scaling/>
+        <c:delete val="0"/>
+        <c:axPos val="l"/>
+        <c:majorGridlines/>
+        <c:majorTickMark val="out"/>
+        <c:minorTickMark val="none"/>
+        <c:tickLblPos val="nextTo"/>
+        <c:crossAx val="-2068027336"/>
+        <c:crosses val="autoZero"/>
+      </c:valAx>
+    </c:plotArea>
+    <c:dispBlanksAs val="gap"/>
+  </c:chart>
+  <c:txPr>
+    <a:bodyPr/>
+    <a:lstStyle/>
+    <a:p>
+      <a:pPr>
+        <a:defRPr sz="1800"/>
       </a:pPr>
       <a:endParaRPr lang="en-US"/>
     </a:p>
@@ -4515,6 +5571,462 @@
           </a:p>
         </p:txBody>
       </p:sp>
+    </p:spTree>
+  </p:cSld>
+  <p:clrMapOvr>
+    <a:masterClrMapping/>
+  </p:clrMapOvr>
+</p:sld>
+</file>
+
+<file path=ppt/slides/slide11.xml><?xml version="1.0" encoding="utf-8"?>
+<p:sld xmlns:a="http://schemas.openxmlformats.org/drawingml/2006/main" xmlns:p="http://schemas.openxmlformats.org/presentationml/2006/main" xmlns:r="http://schemas.openxmlformats.org/officeDocument/2006/relationships">
+  <p:cSld>
+    <p:spTree>
+      <p:nvGrpSpPr>
+        <p:cNvPr id="1" name=""/>
+        <p:cNvGrpSpPr/>
+        <p:nvPr/>
+      </p:nvGrpSpPr>
+      <p:grpSpPr/>
+      <p:sp>
+        <p:nvSpPr>
+          <p:cNvPr id="2" name="Title 1"/>
+          <p:cNvSpPr>
+            <a:spLocks noGrp="1"/>
+          </p:cNvSpPr>
+          <p:nvPr>
+            <p:ph type="title"/>
+          </p:nvPr>
+        </p:nvSpPr>
+        <p:spPr/>
+        <p:txBody>
+          <a:bodyPr/>
+          <a:lstStyle/>
+          <a:p>
+            <a:r>
+              <a:t>Klein Piesangs</a:t>
+            </a:r>
+          </a:p>
+        </p:txBody>
+      </p:sp>
+      <p:graphicFrame>
+        <p:nvGraphicFramePr>
+          <p:cNvPr id="3" name="Chart 2"/>
+          <p:cNvGraphicFramePr>
+            <a:graphicFrameLocks noGrp="1"/>
+          </p:cNvGraphicFramePr>
+          <p:nvPr/>
+        </p:nvGraphicFramePr>
+        <p:xfrm>
+          <a:off x="914400" y="1828800"/>
+          <a:ext cx="7315200" cy="4114800"/>
+        </p:xfrm>
+        <a:graphic>
+          <a:graphicData uri="http://schemas.openxmlformats.org/drawingml/2006/chart">
+            <c:chart xmlns:c="http://schemas.openxmlformats.org/drawingml/2006/chart" r:id="rId2"/>
+          </a:graphicData>
+        </a:graphic>
+      </p:graphicFrame>
+    </p:spTree>
+  </p:cSld>
+  <p:clrMapOvr>
+    <a:masterClrMapping/>
+  </p:clrMapOvr>
+</p:sld>
+</file>
+
+<file path=ppt/slides/slide12.xml><?xml version="1.0" encoding="utf-8"?>
+<p:sld xmlns:a="http://schemas.openxmlformats.org/drawingml/2006/main" xmlns:p="http://schemas.openxmlformats.org/presentationml/2006/main" xmlns:r="http://schemas.openxmlformats.org/officeDocument/2006/relationships">
+  <p:cSld>
+    <p:spTree>
+      <p:nvGrpSpPr>
+        <p:cNvPr id="1" name=""/>
+        <p:cNvGrpSpPr/>
+        <p:nvPr/>
+      </p:nvGrpSpPr>
+      <p:grpSpPr/>
+      <p:sp>
+        <p:nvSpPr>
+          <p:cNvPr id="2" name="Title 1"/>
+          <p:cNvSpPr>
+            <a:spLocks noGrp="1"/>
+          </p:cNvSpPr>
+          <p:nvPr>
+            <p:ph type="title"/>
+          </p:nvPr>
+        </p:nvSpPr>
+        <p:spPr/>
+        <p:txBody>
+          <a:bodyPr/>
+          <a:lstStyle/>
+          <a:p>
+            <a:r>
+              <a:t>Klein Piesangs</a:t>
+            </a:r>
+          </a:p>
+        </p:txBody>
+      </p:sp>
+      <p:graphicFrame>
+        <p:nvGraphicFramePr>
+          <p:cNvPr id="3" name="Chart 2"/>
+          <p:cNvGraphicFramePr>
+            <a:graphicFrameLocks noGrp="1"/>
+          </p:cNvGraphicFramePr>
+          <p:nvPr/>
+        </p:nvGraphicFramePr>
+        <p:xfrm>
+          <a:off x="914400" y="1828800"/>
+          <a:ext cx="7315200" cy="4114800"/>
+        </p:xfrm>
+        <a:graphic>
+          <a:graphicData uri="http://schemas.openxmlformats.org/drawingml/2006/chart">
+            <c:chart xmlns:c="http://schemas.openxmlformats.org/drawingml/2006/chart" r:id="rId2"/>
+          </a:graphicData>
+        </a:graphic>
+      </p:graphicFrame>
+    </p:spTree>
+  </p:cSld>
+  <p:clrMapOvr>
+    <a:masterClrMapping/>
+  </p:clrMapOvr>
+</p:sld>
+</file>
+
+<file path=ppt/slides/slide13.xml><?xml version="1.0" encoding="utf-8"?>
+<p:sld xmlns:a="http://schemas.openxmlformats.org/drawingml/2006/main" xmlns:p="http://schemas.openxmlformats.org/presentationml/2006/main" xmlns:r="http://schemas.openxmlformats.org/officeDocument/2006/relationships">
+  <p:cSld>
+    <p:spTree>
+      <p:nvGrpSpPr>
+        <p:cNvPr id="1" name=""/>
+        <p:cNvGrpSpPr/>
+        <p:nvPr/>
+      </p:nvGrpSpPr>
+      <p:grpSpPr/>
+      <p:sp>
+        <p:nvSpPr>
+          <p:cNvPr id="2" name="Title 1"/>
+          <p:cNvSpPr>
+            <a:spLocks noGrp="1"/>
+          </p:cNvSpPr>
+          <p:nvPr>
+            <p:ph type="title"/>
+          </p:nvPr>
+        </p:nvSpPr>
+        <p:spPr/>
+        <p:txBody>
+          <a:bodyPr/>
+          <a:lstStyle/>
+          <a:p>
+            <a:r>
+              <a:t>Klein Piesangs</a:t>
+            </a:r>
+          </a:p>
+        </p:txBody>
+      </p:sp>
+      <p:graphicFrame>
+        <p:nvGraphicFramePr>
+          <p:cNvPr id="3" name="Chart 2"/>
+          <p:cNvGraphicFramePr>
+            <a:graphicFrameLocks noGrp="1"/>
+          </p:cNvGraphicFramePr>
+          <p:nvPr/>
+        </p:nvGraphicFramePr>
+        <p:xfrm>
+          <a:off x="914400" y="1828800"/>
+          <a:ext cx="7315200" cy="4114800"/>
+        </p:xfrm>
+        <a:graphic>
+          <a:graphicData uri="http://schemas.openxmlformats.org/drawingml/2006/chart">
+            <c:chart xmlns:c="http://schemas.openxmlformats.org/drawingml/2006/chart" r:id="rId2"/>
+          </a:graphicData>
+        </a:graphic>
+      </p:graphicFrame>
+    </p:spTree>
+  </p:cSld>
+  <p:clrMapOvr>
+    <a:masterClrMapping/>
+  </p:clrMapOvr>
+</p:sld>
+</file>
+
+<file path=ppt/slides/slide14.xml><?xml version="1.0" encoding="utf-8"?>
+<p:sld xmlns:a="http://schemas.openxmlformats.org/drawingml/2006/main" xmlns:p="http://schemas.openxmlformats.org/presentationml/2006/main" xmlns:r="http://schemas.openxmlformats.org/officeDocument/2006/relationships">
+  <p:cSld>
+    <p:spTree>
+      <p:nvGrpSpPr>
+        <p:cNvPr id="1" name=""/>
+        <p:cNvGrpSpPr/>
+        <p:nvPr/>
+      </p:nvGrpSpPr>
+      <p:grpSpPr/>
+      <p:sp>
+        <p:nvSpPr>
+          <p:cNvPr id="2" name="Title 1"/>
+          <p:cNvSpPr>
+            <a:spLocks noGrp="1"/>
+          </p:cNvSpPr>
+          <p:nvPr>
+            <p:ph type="title"/>
+          </p:nvPr>
+        </p:nvSpPr>
+        <p:spPr/>
+        <p:txBody>
+          <a:bodyPr/>
+          <a:lstStyle/>
+          <a:p>
+            <a:r>
+              <a:t>Souskluie</a:t>
+            </a:r>
+          </a:p>
+        </p:txBody>
+      </p:sp>
+      <p:graphicFrame>
+        <p:nvGraphicFramePr>
+          <p:cNvPr id="3" name="Chart 2"/>
+          <p:cNvGraphicFramePr>
+            <a:graphicFrameLocks noGrp="1"/>
+          </p:cNvGraphicFramePr>
+          <p:nvPr/>
+        </p:nvGraphicFramePr>
+        <p:xfrm>
+          <a:off x="914400" y="1828800"/>
+          <a:ext cx="7315200" cy="4114800"/>
+        </p:xfrm>
+        <a:graphic>
+          <a:graphicData uri="http://schemas.openxmlformats.org/drawingml/2006/chart">
+            <c:chart xmlns:c="http://schemas.openxmlformats.org/drawingml/2006/chart" r:id="rId2"/>
+          </a:graphicData>
+        </a:graphic>
+      </p:graphicFrame>
+    </p:spTree>
+  </p:cSld>
+  <p:clrMapOvr>
+    <a:masterClrMapping/>
+  </p:clrMapOvr>
+</p:sld>
+</file>
+
+<file path=ppt/slides/slide15.xml><?xml version="1.0" encoding="utf-8"?>
+<p:sld xmlns:a="http://schemas.openxmlformats.org/drawingml/2006/main" xmlns:p="http://schemas.openxmlformats.org/presentationml/2006/main" xmlns:r="http://schemas.openxmlformats.org/officeDocument/2006/relationships">
+  <p:cSld>
+    <p:spTree>
+      <p:nvGrpSpPr>
+        <p:cNvPr id="1" name=""/>
+        <p:cNvGrpSpPr/>
+        <p:nvPr/>
+      </p:nvGrpSpPr>
+      <p:grpSpPr/>
+      <p:sp>
+        <p:nvSpPr>
+          <p:cNvPr id="2" name="Title 1"/>
+          <p:cNvSpPr>
+            <a:spLocks noGrp="1"/>
+          </p:cNvSpPr>
+          <p:nvPr>
+            <p:ph type="title"/>
+          </p:nvPr>
+        </p:nvSpPr>
+        <p:spPr/>
+        <p:txBody>
+          <a:bodyPr/>
+          <a:lstStyle/>
+          <a:p>
+            <a:r>
+              <a:t>Klein Piesangs</a:t>
+            </a:r>
+          </a:p>
+        </p:txBody>
+      </p:sp>
+      <p:graphicFrame>
+        <p:nvGraphicFramePr>
+          <p:cNvPr id="3" name="Chart 2"/>
+          <p:cNvGraphicFramePr>
+            <a:graphicFrameLocks noGrp="1"/>
+          </p:cNvGraphicFramePr>
+          <p:nvPr/>
+        </p:nvGraphicFramePr>
+        <p:xfrm>
+          <a:off x="914400" y="1828800"/>
+          <a:ext cx="7315200" cy="4114800"/>
+        </p:xfrm>
+        <a:graphic>
+          <a:graphicData uri="http://schemas.openxmlformats.org/drawingml/2006/chart">
+            <c:chart xmlns:c="http://schemas.openxmlformats.org/drawingml/2006/chart" r:id="rId2"/>
+          </a:graphicData>
+        </a:graphic>
+      </p:graphicFrame>
+    </p:spTree>
+  </p:cSld>
+  <p:clrMapOvr>
+    <a:masterClrMapping/>
+  </p:clrMapOvr>
+</p:sld>
+</file>
+
+<file path=ppt/slides/slide16.xml><?xml version="1.0" encoding="utf-8"?>
+<p:sld xmlns:a="http://schemas.openxmlformats.org/drawingml/2006/main" xmlns:p="http://schemas.openxmlformats.org/presentationml/2006/main" xmlns:r="http://schemas.openxmlformats.org/officeDocument/2006/relationships">
+  <p:cSld>
+    <p:spTree>
+      <p:nvGrpSpPr>
+        <p:cNvPr id="1" name=""/>
+        <p:cNvGrpSpPr/>
+        <p:nvPr/>
+      </p:nvGrpSpPr>
+      <p:grpSpPr/>
+      <p:sp>
+        <p:nvSpPr>
+          <p:cNvPr id="2" name="Title 1"/>
+          <p:cNvSpPr>
+            <a:spLocks noGrp="1"/>
+          </p:cNvSpPr>
+          <p:nvPr>
+            <p:ph type="title"/>
+          </p:nvPr>
+        </p:nvSpPr>
+        <p:spPr/>
+        <p:txBody>
+          <a:bodyPr/>
+          <a:lstStyle/>
+          <a:p>
+            <a:r>
+              <a:t>Souskluie</a:t>
+            </a:r>
+          </a:p>
+        </p:txBody>
+      </p:sp>
+      <p:graphicFrame>
+        <p:nvGraphicFramePr>
+          <p:cNvPr id="3" name="Chart 2"/>
+          <p:cNvGraphicFramePr>
+            <a:graphicFrameLocks noGrp="1"/>
+          </p:cNvGraphicFramePr>
+          <p:nvPr/>
+        </p:nvGraphicFramePr>
+        <p:xfrm>
+          <a:off x="914400" y="1828800"/>
+          <a:ext cx="7315200" cy="4114800"/>
+        </p:xfrm>
+        <a:graphic>
+          <a:graphicData uri="http://schemas.openxmlformats.org/drawingml/2006/chart">
+            <c:chart xmlns:c="http://schemas.openxmlformats.org/drawingml/2006/chart" r:id="rId2"/>
+          </a:graphicData>
+        </a:graphic>
+      </p:graphicFrame>
+    </p:spTree>
+  </p:cSld>
+  <p:clrMapOvr>
+    <a:masterClrMapping/>
+  </p:clrMapOvr>
+</p:sld>
+</file>
+
+<file path=ppt/slides/slide17.xml><?xml version="1.0" encoding="utf-8"?>
+<p:sld xmlns:a="http://schemas.openxmlformats.org/drawingml/2006/main" xmlns:p="http://schemas.openxmlformats.org/presentationml/2006/main" xmlns:r="http://schemas.openxmlformats.org/officeDocument/2006/relationships">
+  <p:cSld>
+    <p:spTree>
+      <p:nvGrpSpPr>
+        <p:cNvPr id="1" name=""/>
+        <p:cNvGrpSpPr/>
+        <p:nvPr/>
+      </p:nvGrpSpPr>
+      <p:grpSpPr/>
+      <p:sp>
+        <p:nvSpPr>
+          <p:cNvPr id="2" name="Title 1"/>
+          <p:cNvSpPr>
+            <a:spLocks noGrp="1"/>
+          </p:cNvSpPr>
+          <p:nvPr>
+            <p:ph type="title"/>
+          </p:nvPr>
+        </p:nvSpPr>
+        <p:spPr/>
+        <p:txBody>
+          <a:bodyPr/>
+          <a:lstStyle/>
+          <a:p>
+            <a:r>
+              <a:t>Klein Piesangs</a:t>
+            </a:r>
+          </a:p>
+        </p:txBody>
+      </p:sp>
+      <p:graphicFrame>
+        <p:nvGraphicFramePr>
+          <p:cNvPr id="3" name="Chart 2"/>
+          <p:cNvGraphicFramePr>
+            <a:graphicFrameLocks noGrp="1"/>
+          </p:cNvGraphicFramePr>
+          <p:nvPr/>
+        </p:nvGraphicFramePr>
+        <p:xfrm>
+          <a:off x="914400" y="1828800"/>
+          <a:ext cx="7315200" cy="4114800"/>
+        </p:xfrm>
+        <a:graphic>
+          <a:graphicData uri="http://schemas.openxmlformats.org/drawingml/2006/chart">
+            <c:chart xmlns:c="http://schemas.openxmlformats.org/drawingml/2006/chart" r:id="rId2"/>
+          </a:graphicData>
+        </a:graphic>
+      </p:graphicFrame>
+    </p:spTree>
+  </p:cSld>
+  <p:clrMapOvr>
+    <a:masterClrMapping/>
+  </p:clrMapOvr>
+</p:sld>
+</file>
+
+<file path=ppt/slides/slide18.xml><?xml version="1.0" encoding="utf-8"?>
+<p:sld xmlns:a="http://schemas.openxmlformats.org/drawingml/2006/main" xmlns:p="http://schemas.openxmlformats.org/presentationml/2006/main" xmlns:r="http://schemas.openxmlformats.org/officeDocument/2006/relationships">
+  <p:cSld>
+    <p:spTree>
+      <p:nvGrpSpPr>
+        <p:cNvPr id="1" name=""/>
+        <p:cNvGrpSpPr/>
+        <p:nvPr/>
+      </p:nvGrpSpPr>
+      <p:grpSpPr/>
+      <p:sp>
+        <p:nvSpPr>
+          <p:cNvPr id="2" name="Title 1"/>
+          <p:cNvSpPr>
+            <a:spLocks noGrp="1"/>
+          </p:cNvSpPr>
+          <p:nvPr>
+            <p:ph type="title"/>
+          </p:nvPr>
+        </p:nvSpPr>
+        <p:spPr/>
+        <p:txBody>
+          <a:bodyPr/>
+          <a:lstStyle/>
+          <a:p>
+            <a:r>
+              <a:t>Souskluie</a:t>
+            </a:r>
+          </a:p>
+        </p:txBody>
+      </p:sp>
+      <p:graphicFrame>
+        <p:nvGraphicFramePr>
+          <p:cNvPr id="3" name="Chart 2"/>
+          <p:cNvGraphicFramePr>
+            <a:graphicFrameLocks noGrp="1"/>
+          </p:cNvGraphicFramePr>
+          <p:nvPr/>
+        </p:nvGraphicFramePr>
+        <p:xfrm>
+          <a:off x="914400" y="1828800"/>
+          <a:ext cx="7315200" cy="4114800"/>
+        </p:xfrm>
+        <a:graphic>
+          <a:graphicData uri="http://schemas.openxmlformats.org/drawingml/2006/chart">
+            <c:chart xmlns:c="http://schemas.openxmlformats.org/drawingml/2006/chart" r:id="rId2"/>
+          </a:graphicData>
+        </a:graphic>
+      </p:graphicFrame>
     </p:spTree>
   </p:cSld>
   <p:clrMapOvr>

</xml_diff>